<commit_message>
Added titles and updated objectives to modules 02-07 for windows based workstations
</commit_message>
<xml_diff>
--- a/02-Resources-windows.pptx
+++ b/02-Resources-windows.pptx
@@ -294,7 +294,7 @@
               <a:pPr>
                 <a:defRPr/>
               </a:pPr>
-              <a:t>2015-11-02</a:t>
+              <a:t>2015-11-10</a:t>
             </a:fld>
             <a:endParaRPr lang="en-US" dirty="0"/>
           </a:p>
@@ -477,7 +477,7 @@
               <a:pPr>
                 <a:defRPr/>
               </a:pPr>
-              <a:t>2015-11-02</a:t>
+              <a:t>2015-11-10</a:t>
             </a:fld>
             <a:endParaRPr lang="en-US" dirty="0"/>
           </a:p>
@@ -1443,14 +1443,14 @@
           </a:ln>
           <a:extLst>
             <a:ext uri="{909E8E84-426E-40dd-AFC4-6F175D3DCCD1}">
-              <a14:hiddenFill xmlns="" xmlns:a14="http://schemas.microsoft.com/office/drawing/2010/main">
+              <a14:hiddenFill xmlns:a14="http://schemas.microsoft.com/office/drawing/2010/main" xmlns="">
                 <a:solidFill>
                   <a:srgbClr val="FFFFFF"/>
                 </a:solidFill>
               </a14:hiddenFill>
             </a:ext>
             <a:ext uri="{91240B29-F687-4f45-9708-019B960494DF}">
-              <a14:hiddenLine xmlns="" xmlns:a14="http://schemas.microsoft.com/office/drawing/2010/main" w="9525">
+              <a14:hiddenLine xmlns:a14="http://schemas.microsoft.com/office/drawing/2010/main" xmlns="" w="9525">
                 <a:solidFill>
                   <a:srgbClr val="000000"/>
                 </a:solidFill>
@@ -1598,14 +1598,14 @@
           </a:ln>
           <a:extLst>
             <a:ext uri="{909E8E84-426E-40dd-AFC4-6F175D3DCCD1}">
-              <a14:hiddenFill xmlns="" xmlns:a14="http://schemas.microsoft.com/office/drawing/2010/main">
+              <a14:hiddenFill xmlns:a14="http://schemas.microsoft.com/office/drawing/2010/main" xmlns="">
                 <a:solidFill>
                   <a:srgbClr val="FFFFFF"/>
                 </a:solidFill>
               </a14:hiddenFill>
             </a:ext>
             <a:ext uri="{91240B29-F687-4f45-9708-019B960494DF}">
-              <a14:hiddenLine xmlns="" xmlns:a14="http://schemas.microsoft.com/office/drawing/2010/main" w="9525">
+              <a14:hiddenLine xmlns:a14="http://schemas.microsoft.com/office/drawing/2010/main" xmlns="" w="9525">
                 <a:solidFill>
                   <a:srgbClr val="000000"/>
                 </a:solidFill>
@@ -2096,14 +2096,14 @@
           </a:ln>
           <a:extLst>
             <a:ext uri="{909E8E84-426E-40dd-AFC4-6F175D3DCCD1}">
-              <a14:hiddenFill xmlns="" xmlns:a14="http://schemas.microsoft.com/office/drawing/2010/main">
+              <a14:hiddenFill xmlns:a14="http://schemas.microsoft.com/office/drawing/2010/main" xmlns="">
                 <a:solidFill>
                   <a:srgbClr val="FFFFFF"/>
                 </a:solidFill>
               </a14:hiddenFill>
             </a:ext>
             <a:ext uri="{91240B29-F687-4f45-9708-019B960494DF}">
-              <a14:hiddenLine xmlns="" xmlns:a14="http://schemas.microsoft.com/office/drawing/2010/main" w="9525">
+              <a14:hiddenLine xmlns:a14="http://schemas.microsoft.com/office/drawing/2010/main" xmlns="" w="9525">
                 <a:solidFill>
                   <a:srgbClr val="000000"/>
                 </a:solidFill>
@@ -3552,14 +3552,14 @@
           </a:ln>
           <a:extLst>
             <a:ext uri="{909E8E84-426E-40dd-AFC4-6F175D3DCCD1}">
-              <a14:hiddenFill xmlns="" xmlns:a14="http://schemas.microsoft.com/office/drawing/2010/main">
+              <a14:hiddenFill xmlns:a14="http://schemas.microsoft.com/office/drawing/2010/main" xmlns="">
                 <a:solidFill>
                   <a:srgbClr val="FFFFFF"/>
                 </a:solidFill>
               </a14:hiddenFill>
             </a:ext>
             <a:ext uri="{91240B29-F687-4f45-9708-019B960494DF}">
-              <a14:hiddenLine xmlns="" xmlns:a14="http://schemas.microsoft.com/office/drawing/2010/main" w="9525">
+              <a14:hiddenLine xmlns:a14="http://schemas.microsoft.com/office/drawing/2010/main" xmlns="" w="9525">
                 <a:solidFill>
                   <a:srgbClr val="000000"/>
                 </a:solidFill>
@@ -4913,14 +4913,14 @@
           </a:ln>
           <a:extLst>
             <a:ext uri="{909E8E84-426E-40dd-AFC4-6F175D3DCCD1}">
-              <a14:hiddenFill xmlns="" xmlns:a14="http://schemas.microsoft.com/office/drawing/2010/main">
+              <a14:hiddenFill xmlns:a14="http://schemas.microsoft.com/office/drawing/2010/main" xmlns="">
                 <a:solidFill>
                   <a:srgbClr val="FFFFFF"/>
                 </a:solidFill>
               </a14:hiddenFill>
             </a:ext>
             <a:ext uri="{91240B29-F687-4f45-9708-019B960494DF}">
-              <a14:hiddenLine xmlns="" xmlns:a14="http://schemas.microsoft.com/office/drawing/2010/main" w="9525">
+              <a14:hiddenLine xmlns:a14="http://schemas.microsoft.com/office/drawing/2010/main" xmlns="" w="9525">
                 <a:solidFill>
                   <a:srgbClr val="000000"/>
                 </a:solidFill>
@@ -5478,14 +5478,14 @@
           </a:ln>
           <a:extLst>
             <a:ext uri="{909E8E84-426E-40dd-AFC4-6F175D3DCCD1}">
-              <a14:hiddenFill xmlns="" xmlns:a14="http://schemas.microsoft.com/office/drawing/2010/main">
+              <a14:hiddenFill xmlns:a14="http://schemas.microsoft.com/office/drawing/2010/main" xmlns="">
                 <a:solidFill>
                   <a:srgbClr val="FFFFFF"/>
                 </a:solidFill>
               </a14:hiddenFill>
             </a:ext>
             <a:ext uri="{91240B29-F687-4f45-9708-019B960494DF}">
-              <a14:hiddenLine xmlns="" xmlns:a14="http://schemas.microsoft.com/office/drawing/2010/main" w="9525">
+              <a14:hiddenLine xmlns:a14="http://schemas.microsoft.com/office/drawing/2010/main" xmlns="" w="9525">
                 <a:solidFill>
                   <a:srgbClr val="000000"/>
                 </a:solidFill>
@@ -6052,14 +6052,14 @@
           </a:ln>
           <a:extLst>
             <a:ext uri="{909E8E84-426E-40dd-AFC4-6F175D3DCCD1}">
-              <a14:hiddenFill xmlns="" xmlns:a14="http://schemas.microsoft.com/office/drawing/2010/main">
+              <a14:hiddenFill xmlns:a14="http://schemas.microsoft.com/office/drawing/2010/main" xmlns="">
                 <a:solidFill>
                   <a:srgbClr val="FFFFFF"/>
                 </a:solidFill>
               </a14:hiddenFill>
             </a:ext>
             <a:ext uri="{91240B29-F687-4f45-9708-019B960494DF}">
-              <a14:hiddenLine xmlns="" xmlns:a14="http://schemas.microsoft.com/office/drawing/2010/main" w="9525">
+              <a14:hiddenLine xmlns:a14="http://schemas.microsoft.com/office/drawing/2010/main" xmlns="" w="9525">
                 <a:solidFill>
                   <a:srgbClr val="000000"/>
                 </a:solidFill>
@@ -6999,14 +6999,14 @@
           </a:ln>
           <a:extLst>
             <a:ext uri="{909E8E84-426E-40dd-AFC4-6F175D3DCCD1}">
-              <a14:hiddenFill xmlns="" xmlns:a14="http://schemas.microsoft.com/office/drawing/2010/main">
+              <a14:hiddenFill xmlns:a14="http://schemas.microsoft.com/office/drawing/2010/main" xmlns="">
                 <a:solidFill>
                   <a:srgbClr val="FFFFFF"/>
                 </a:solidFill>
               </a14:hiddenFill>
             </a:ext>
             <a:ext uri="{91240B29-F687-4f45-9708-019B960494DF}">
-              <a14:hiddenLine xmlns="" xmlns:a14="http://schemas.microsoft.com/office/drawing/2010/main" w="9525">
+              <a14:hiddenLine xmlns:a14="http://schemas.microsoft.com/office/drawing/2010/main" xmlns="" w="9525">
                 <a:solidFill>
                   <a:srgbClr val="000000"/>
                 </a:solidFill>
@@ -7746,14 +7746,14 @@
           </a:ln>
           <a:extLst>
             <a:ext uri="{909E8E84-426E-40dd-AFC4-6F175D3DCCD1}">
-              <a14:hiddenFill xmlns="" xmlns:a14="http://schemas.microsoft.com/office/drawing/2010/main">
+              <a14:hiddenFill xmlns:a14="http://schemas.microsoft.com/office/drawing/2010/main" xmlns="">
                 <a:solidFill>
                   <a:srgbClr val="FFFFFF"/>
                 </a:solidFill>
               </a14:hiddenFill>
             </a:ext>
             <a:ext uri="{91240B29-F687-4f45-9708-019B960494DF}">
-              <a14:hiddenLine xmlns="" xmlns:a14="http://schemas.microsoft.com/office/drawing/2010/main" w="9525">
+              <a14:hiddenLine xmlns:a14="http://schemas.microsoft.com/office/drawing/2010/main" xmlns="" w="9525">
                 <a:solidFill>
                   <a:srgbClr val="000000"/>
                 </a:solidFill>
@@ -8493,7 +8493,11 @@
           <a:bodyPr/>
           <a:lstStyle/>
           <a:p>
-            <a:endParaRPr lang="en-US"/>
+            <a:r>
+              <a:rPr lang="en-US" dirty="0" smtClean="0"/>
+              <a:t>Chef Resources</a:t>
+            </a:r>
+            <a:endParaRPr lang="en-US" dirty="0"/>
           </a:p>
         </p:txBody>
       </p:sp>
@@ -8568,11 +8572,7 @@
           <a:p>
             <a:r>
               <a:rPr lang="en-US" dirty="0" smtClean="0"/>
-              <a:t>Managing </a:t>
-            </a:r>
-            <a:r>
-              <a:rPr lang="en-US" dirty="0" smtClean="0"/>
-              <a:t>a File</a:t>
+              <a:t>Managing a File</a:t>
             </a:r>
             <a:endParaRPr lang="en-US" dirty="0"/>
           </a:p>
@@ -9062,11 +9062,7 @@
           <a:p>
             <a:r>
               <a:rPr lang="en-US" dirty="0" smtClean="0"/>
-              <a:t>Managing </a:t>
-            </a:r>
-            <a:r>
-              <a:rPr lang="en-US" dirty="0" smtClean="0"/>
-              <a:t>a File</a:t>
+              <a:t>Managing a File</a:t>
             </a:r>
             <a:endParaRPr lang="en-US" dirty="0"/>
           </a:p>
@@ -9205,11 +9201,7 @@
           <a:p>
             <a:r>
               <a:rPr lang="en-US" dirty="0" smtClean="0"/>
-              <a:t>Deleting </a:t>
-            </a:r>
-            <a:r>
-              <a:rPr lang="en-US" dirty="0" smtClean="0"/>
-              <a:t>a File</a:t>
+              <a:t>Deleting a File</a:t>
             </a:r>
             <a:endParaRPr lang="en-US" dirty="0"/>
           </a:p>
@@ -9266,15 +9258,7 @@
                 <a:ea typeface="Courier New" charset="0"/>
                 <a:cs typeface="Courier New" charset="0"/>
               </a:rPr>
-              <a:t>The file named </a:t>
-            </a:r>
-            <a:r>
-              <a:rPr lang="en-US" b="1" dirty="0" smtClean="0">
-                <a:latin typeface="Courier New" charset="0"/>
-                <a:ea typeface="Courier New" charset="0"/>
-                <a:cs typeface="Courier New" charset="0"/>
-              </a:rPr>
-              <a:t>'</a:t>
+              <a:t>The file named '</a:t>
             </a:r>
             <a:r>
               <a:rPr lang="en-US" b="1" dirty="0" err="1" smtClean="0">
@@ -9290,15 +9274,7 @@
                 <a:ea typeface="Courier New" charset="0"/>
                 <a:cs typeface="Courier New" charset="0"/>
               </a:rPr>
-              <a:t>' </a:t>
-            </a:r>
-            <a:r>
-              <a:rPr lang="en-US" b="1" dirty="0" smtClean="0">
-                <a:latin typeface="Courier New" charset="0"/>
-                <a:ea typeface="Courier New" charset="0"/>
-                <a:cs typeface="Courier New" charset="0"/>
-              </a:rPr>
-              <a:t>is deleted.</a:t>
+              <a:t>' is deleted.</a:t>
             </a:r>
           </a:p>
           <a:p>
@@ -9385,11 +9361,7 @@
           <a:p>
             <a:r>
               <a:rPr lang="en-US" b="1" dirty="0" smtClean="0"/>
-              <a:t>file </a:t>
-            </a:r>
-            <a:r>
-              <a:rPr lang="en-US" b="1" dirty="0" smtClean="0"/>
-              <a:t>'</a:t>
+              <a:t>file '</a:t>
             </a:r>
             <a:r>
               <a:rPr lang="en-US" b="1" dirty="0" err="1" smtClean="0"/>
@@ -9397,11 +9369,7 @@
             </a:r>
             <a:r>
               <a:rPr lang="en-US" b="1" dirty="0" smtClean="0"/>
-              <a:t>' </a:t>
-            </a:r>
-            <a:r>
-              <a:rPr lang="en-US" b="1" dirty="0" smtClean="0"/>
-              <a:t>do</a:t>
+              <a:t>' do</a:t>
             </a:r>
           </a:p>
           <a:p>
@@ -10575,11 +10543,7 @@
           <a:p>
             <a:r>
               <a:rPr lang="en-US" dirty="0" smtClean="0"/>
-              <a:t>&gt; cd </a:t>
-            </a:r>
-            <a:r>
-              <a:rPr lang="en-US" dirty="0" smtClean="0"/>
-              <a:t>Desktop</a:t>
+              <a:t>&gt; cd Desktop</a:t>
             </a:r>
             <a:endParaRPr lang="en-US" dirty="0"/>
           </a:p>
@@ -10812,11 +10776,7 @@
           <a:p>
             <a:r>
               <a:rPr lang="en-US" b="1" dirty="0" smtClean="0"/>
-              <a:t>file </a:t>
-            </a:r>
-            <a:r>
-              <a:rPr lang="en-US" b="1" dirty="0" smtClean="0"/>
-              <a:t>'</a:t>
+              <a:t>file '</a:t>
             </a:r>
             <a:r>
               <a:rPr lang="en-US" b="1" dirty="0" err="1" smtClean="0"/>
@@ -10824,23 +10784,14 @@
             </a:r>
             <a:r>
               <a:rPr lang="en-US" b="1" dirty="0" smtClean="0"/>
-              <a:t>' </a:t>
-            </a:r>
+              <a:t>' do</a:t>
+            </a:r>
+          </a:p>
+          <a:p>
             <a:r>
               <a:rPr lang="en-US" b="1" dirty="0" smtClean="0"/>
-              <a:t>do</a:t>
-            </a:r>
-          </a:p>
-          <a:p>
-            <a:r>
-              <a:rPr lang="en-US" b="1" dirty="0" smtClean="0"/>
-              <a:t>  content </a:t>
-            </a:r>
-            <a:r>
-              <a:rPr lang="en-US" b="1" dirty="0" smtClean="0"/>
-              <a:t>'Hello, world!'</a:t>
-            </a:r>
-            <a:endParaRPr lang="en-US" b="1" dirty="0" smtClean="0"/>
+              <a:t>  content 'Hello, world!'</a:t>
+            </a:r>
           </a:p>
           <a:p>
             <a:r>

</xml_diff>